<commit_message>
Changed Sequence Diagram Color because it does not match the color to Architecture Diagram
</commit_message>
<xml_diff>
--- a/docs/diagrams/DistributeSequenceDiagram.pptx
+++ b/docs/diagrams/DistributeSequenceDiagram.pptx
@@ -199,7 +199,7 @@
           <a:p>
             <a:fld id="{D54ACF14-8131-410A-B638-7D74DAF310FB}" type="datetimeFigureOut">
               <a:rPr lang="en-SG" smtClean="0"/>
-              <a:t>29/10/2018</a:t>
+              <a:t>7/11/2018</a:t>
             </a:fld>
             <a:endParaRPr lang="en-SG"/>
           </a:p>
@@ -784,7 +784,7 @@
           <a:p>
             <a:fld id="{C6FCF0AC-6F18-4888-8D49-71E482610323}" type="datetimeFigureOut">
               <a:rPr lang="en-SG" smtClean="0"/>
-              <a:t>29/10/2018</a:t>
+              <a:t>7/11/2018</a:t>
             </a:fld>
             <a:endParaRPr lang="en-SG"/>
           </a:p>
@@ -984,7 +984,7 @@
           <a:p>
             <a:fld id="{C6FCF0AC-6F18-4888-8D49-71E482610323}" type="datetimeFigureOut">
               <a:rPr lang="en-SG" smtClean="0"/>
-              <a:t>29/10/2018</a:t>
+              <a:t>7/11/2018</a:t>
             </a:fld>
             <a:endParaRPr lang="en-SG"/>
           </a:p>
@@ -1194,7 +1194,7 @@
           <a:p>
             <a:fld id="{C6FCF0AC-6F18-4888-8D49-71E482610323}" type="datetimeFigureOut">
               <a:rPr lang="en-SG" smtClean="0"/>
-              <a:t>29/10/2018</a:t>
+              <a:t>7/11/2018</a:t>
             </a:fld>
             <a:endParaRPr lang="en-SG"/>
           </a:p>
@@ -1394,7 +1394,7 @@
           <a:p>
             <a:fld id="{C6FCF0AC-6F18-4888-8D49-71E482610323}" type="datetimeFigureOut">
               <a:rPr lang="en-SG" smtClean="0"/>
-              <a:t>29/10/2018</a:t>
+              <a:t>7/11/2018</a:t>
             </a:fld>
             <a:endParaRPr lang="en-SG"/>
           </a:p>
@@ -1670,7 +1670,7 @@
           <a:p>
             <a:fld id="{C6FCF0AC-6F18-4888-8D49-71E482610323}" type="datetimeFigureOut">
               <a:rPr lang="en-SG" smtClean="0"/>
-              <a:t>29/10/2018</a:t>
+              <a:t>7/11/2018</a:t>
             </a:fld>
             <a:endParaRPr lang="en-SG"/>
           </a:p>
@@ -1938,7 +1938,7 @@
           <a:p>
             <a:fld id="{C6FCF0AC-6F18-4888-8D49-71E482610323}" type="datetimeFigureOut">
               <a:rPr lang="en-SG" smtClean="0"/>
-              <a:t>29/10/2018</a:t>
+              <a:t>7/11/2018</a:t>
             </a:fld>
             <a:endParaRPr lang="en-SG"/>
           </a:p>
@@ -2353,7 +2353,7 @@
           <a:p>
             <a:fld id="{C6FCF0AC-6F18-4888-8D49-71E482610323}" type="datetimeFigureOut">
               <a:rPr lang="en-SG" smtClean="0"/>
-              <a:t>29/10/2018</a:t>
+              <a:t>7/11/2018</a:t>
             </a:fld>
             <a:endParaRPr lang="en-SG"/>
           </a:p>
@@ -2495,7 +2495,7 @@
           <a:p>
             <a:fld id="{C6FCF0AC-6F18-4888-8D49-71E482610323}" type="datetimeFigureOut">
               <a:rPr lang="en-SG" smtClean="0"/>
-              <a:t>29/10/2018</a:t>
+              <a:t>7/11/2018</a:t>
             </a:fld>
             <a:endParaRPr lang="en-SG"/>
           </a:p>
@@ -2608,7 +2608,7 @@
           <a:p>
             <a:fld id="{C6FCF0AC-6F18-4888-8D49-71E482610323}" type="datetimeFigureOut">
               <a:rPr lang="en-SG" smtClean="0"/>
-              <a:t>29/10/2018</a:t>
+              <a:t>7/11/2018</a:t>
             </a:fld>
             <a:endParaRPr lang="en-SG"/>
           </a:p>
@@ -2921,7 +2921,7 @@
           <a:p>
             <a:fld id="{C6FCF0AC-6F18-4888-8D49-71E482610323}" type="datetimeFigureOut">
               <a:rPr lang="en-SG" smtClean="0"/>
-              <a:t>29/10/2018</a:t>
+              <a:t>7/11/2018</a:t>
             </a:fld>
             <a:endParaRPr lang="en-SG"/>
           </a:p>
@@ -3210,7 +3210,7 @@
           <a:p>
             <a:fld id="{C6FCF0AC-6F18-4888-8D49-71E482610323}" type="datetimeFigureOut">
               <a:rPr lang="en-SG" smtClean="0"/>
-              <a:t>29/10/2018</a:t>
+              <a:t>7/11/2018</a:t>
             </a:fld>
             <a:endParaRPr lang="en-SG"/>
           </a:p>
@@ -3453,7 +3453,7 @@
           <a:p>
             <a:fld id="{C6FCF0AC-6F18-4888-8D49-71E482610323}" type="datetimeFigureOut">
               <a:rPr lang="en-SG" smtClean="0"/>
-              <a:t>29/10/2018</a:t>
+              <a:t>7/11/2018</a:t>
             </a:fld>
             <a:endParaRPr lang="en-SG"/>
           </a:p>
@@ -3872,6 +3872,58 @@
       </p:grpSpPr>
       <p:sp>
         <p:nvSpPr>
+          <p:cNvPr id="5" name="Rectangle: Rounded Corners 4">
+            <a:extLst>
+              <a:ext uri="{FF2B5EF4-FFF2-40B4-BE49-F238E27FC236}">
+                <a16:creationId xmlns:a16="http://schemas.microsoft.com/office/drawing/2014/main" id="{7536FA76-4559-41E0-88BE-5F5344511C17}"/>
+              </a:ext>
+            </a:extLst>
+          </p:cNvPr>
+          <p:cNvSpPr/>
+          <p:nvPr/>
+        </p:nvSpPr>
+        <p:spPr>
+          <a:xfrm>
+            <a:off x="12117570" y="0"/>
+            <a:ext cx="2650294" cy="8445863"/>
+          </a:xfrm>
+          <a:prstGeom prst="roundRect">
+            <a:avLst>
+              <a:gd name="adj" fmla="val 3134"/>
+            </a:avLst>
+          </a:prstGeom>
+          <a:solidFill>
+            <a:srgbClr val="DBEEF4"/>
+          </a:solidFill>
+          <a:ln>
+            <a:noFill/>
+          </a:ln>
+        </p:spPr>
+        <p:style>
+          <a:lnRef idx="1">
+            <a:schemeClr val="accent2"/>
+          </a:lnRef>
+          <a:fillRef idx="2">
+            <a:schemeClr val="accent2"/>
+          </a:fillRef>
+          <a:effectRef idx="1">
+            <a:schemeClr val="accent2"/>
+          </a:effectRef>
+          <a:fontRef idx="minor">
+            <a:schemeClr val="dk1"/>
+          </a:fontRef>
+        </p:style>
+        <p:txBody>
+          <a:bodyPr rtlCol="0" anchor="ctr"/>
+          <a:lstStyle/>
+          <a:p>
+            <a:pPr algn="ctr"/>
+            <a:endParaRPr lang="en-SG" dirty="0"/>
+          </a:p>
+        </p:txBody>
+      </p:sp>
+      <p:sp>
+        <p:nvSpPr>
           <p:cNvPr id="294" name="Rectangle: Rounded Corners 293">
             <a:extLst>
               <a:ext uri="{FF2B5EF4-FFF2-40B4-BE49-F238E27FC236}">
@@ -3884,7 +3936,7 @@
         </p:nvSpPr>
         <p:spPr>
           <a:xfrm>
-            <a:off x="14779469" y="-26937"/>
+            <a:off x="14779469" y="34023"/>
             <a:ext cx="6823712" cy="8472800"/>
           </a:xfrm>
           <a:prstGeom prst="roundRect">
@@ -4142,61 +4194,6 @@
       </p:sp>
       <p:sp>
         <p:nvSpPr>
-          <p:cNvPr id="5" name="Rectangle: Rounded Corners 4">
-            <a:extLst>
-              <a:ext uri="{FF2B5EF4-FFF2-40B4-BE49-F238E27FC236}">
-                <a16:creationId xmlns:a16="http://schemas.microsoft.com/office/drawing/2014/main" id="{7536FA76-4559-41E0-88BE-5F5344511C17}"/>
-              </a:ext>
-            </a:extLst>
-          </p:cNvPr>
-          <p:cNvSpPr/>
-          <p:nvPr/>
-        </p:nvSpPr>
-        <p:spPr>
-          <a:xfrm>
-            <a:off x="12117570" y="0"/>
-            <a:ext cx="2650294" cy="8445863"/>
-          </a:xfrm>
-          <a:prstGeom prst="roundRect">
-            <a:avLst>
-              <a:gd name="adj" fmla="val 3134"/>
-            </a:avLst>
-          </a:prstGeom>
-          <a:solidFill>
-            <a:schemeClr val="accent4">
-              <a:lumMod val="20000"/>
-              <a:lumOff val="80000"/>
-            </a:schemeClr>
-          </a:solidFill>
-          <a:ln>
-            <a:noFill/>
-          </a:ln>
-        </p:spPr>
-        <p:style>
-          <a:lnRef idx="1">
-            <a:schemeClr val="accent2"/>
-          </a:lnRef>
-          <a:fillRef idx="2">
-            <a:schemeClr val="accent2"/>
-          </a:fillRef>
-          <a:effectRef idx="1">
-            <a:schemeClr val="accent2"/>
-          </a:effectRef>
-          <a:fontRef idx="minor">
-            <a:schemeClr val="dk1"/>
-          </a:fontRef>
-        </p:style>
-        <p:txBody>
-          <a:bodyPr rtlCol="0" anchor="ctr"/>
-          <a:lstStyle/>
-          <a:p>
-            <a:pPr algn="ctr"/>
-            <a:endParaRPr lang="en-SG" dirty="0"/>
-          </a:p>
-        </p:txBody>
-      </p:sp>
-      <p:sp>
-        <p:nvSpPr>
           <p:cNvPr id="20" name="Rectangle 62">
             <a:extLst>
               <a:ext uri="{FF2B5EF4-FFF2-40B4-BE49-F238E27FC236}">
@@ -5115,9 +5112,13 @@
             <a:avLst/>
           </a:prstGeom>
           <a:solidFill>
-            <a:srgbClr val="FF9933"/>
+            <a:srgbClr val="31859C"/>
           </a:solidFill>
-          <a:ln/>
+          <a:ln>
+            <a:solidFill>
+              <a:schemeClr val="tx1"/>
+            </a:solidFill>
+          </a:ln>
         </p:spPr>
         <p:style>
           <a:lnRef idx="1">
@@ -5185,7 +5186,7 @@
           </a:prstGeom>
           <a:ln w="19050">
             <a:solidFill>
-              <a:srgbClr val="FF9933"/>
+              <a:srgbClr val="31859C"/>
             </a:solidFill>
             <a:prstDash val="sysDash"/>
           </a:ln>
@@ -7092,7 +7093,7 @@
             <a:avLst/>
           </a:prstGeom>
           <a:solidFill>
-            <a:srgbClr val="FF9933"/>
+            <a:srgbClr val="31859C"/>
           </a:solidFill>
           <a:ln>
             <a:solidFill>
@@ -7613,7 +7614,7 @@
             <a:avLst/>
           </a:prstGeom>
           <a:solidFill>
-            <a:srgbClr val="FF9933"/>
+            <a:srgbClr val="31859C"/>
           </a:solidFill>
           <a:ln>
             <a:solidFill>
@@ -7678,7 +7679,7 @@
             <a:avLst/>
           </a:prstGeom>
           <a:solidFill>
-            <a:srgbClr val="FF9933"/>
+            <a:srgbClr val="31859C"/>
           </a:solidFill>
           <a:ln>
             <a:solidFill>
@@ -7743,7 +7744,7 @@
             <a:avLst/>
           </a:prstGeom>
           <a:solidFill>
-            <a:srgbClr val="FF9933"/>
+            <a:srgbClr val="31859C"/>
           </a:solidFill>
           <a:ln>
             <a:solidFill>
@@ -7981,7 +7982,7 @@
           </a:prstGeom>
           <a:ln w="19050">
             <a:solidFill>
-              <a:srgbClr val="FF9933"/>
+              <a:srgbClr val="31859C"/>
             </a:solidFill>
             <a:tailEnd type="triangle"/>
           </a:ln>
@@ -8106,7 +8107,7 @@
             <a:avLst/>
           </a:prstGeom>
           <a:solidFill>
-            <a:srgbClr val="FF9933"/>
+            <a:srgbClr val="31859C"/>
           </a:solidFill>
           <a:ln>
             <a:solidFill>
@@ -8171,7 +8172,7 @@
             <a:avLst/>
           </a:prstGeom>
           <a:solidFill>
-            <a:srgbClr val="FF9933"/>
+            <a:srgbClr val="31859C"/>
           </a:solidFill>
           <a:ln>
             <a:solidFill>
@@ -8236,7 +8237,7 @@
             <a:avLst/>
           </a:prstGeom>
           <a:solidFill>
-            <a:srgbClr val="FF9933"/>
+            <a:srgbClr val="31859C"/>
           </a:solidFill>
           <a:ln>
             <a:solidFill>
@@ -8581,20 +8582,22 @@
               </a:ext>
             </a:extLst>
           </p:cNvPr>
-          <p:cNvCxnSpPr/>
+          <p:cNvCxnSpPr>
+            <a:cxnSpLocks/>
+          </p:cNvCxnSpPr>
           <p:nvPr/>
         </p:nvCxnSpPr>
         <p:spPr>
           <a:xfrm>
-            <a:off x="13751233" y="5510045"/>
-            <a:ext cx="2155769" cy="0"/>
+            <a:off x="13773697" y="5510045"/>
+            <a:ext cx="2133305" cy="0"/>
           </a:xfrm>
           <a:prstGeom prst="straightConnector1">
             <a:avLst/>
           </a:prstGeom>
           <a:ln w="19050">
             <a:solidFill>
-              <a:srgbClr val="FF9933"/>
+              <a:srgbClr val="31859C"/>
             </a:solidFill>
             <a:tailEnd type="triangle"/>
           </a:ln>
@@ -8638,7 +8641,7 @@
           </a:prstGeom>
           <a:ln w="19050">
             <a:solidFill>
-              <a:srgbClr val="FF9933"/>
+              <a:srgbClr val="31859C"/>
             </a:solidFill>
             <a:tailEnd type="triangle"/>
           </a:ln>
@@ -8679,7 +8682,7 @@
             <a:avLst/>
           </a:prstGeom>
           <a:solidFill>
-            <a:srgbClr val="FF9933"/>
+            <a:srgbClr val="31859C"/>
           </a:solidFill>
           <a:ln>
             <a:solidFill>
@@ -8788,7 +8791,7 @@
             <a:avLst/>
           </a:prstGeom>
           <a:solidFill>
-            <a:srgbClr val="FF9933"/>
+            <a:srgbClr val="31859C"/>
           </a:solidFill>
           <a:ln>
             <a:solidFill>
@@ -8897,7 +8900,7 @@
             <a:avLst/>
           </a:prstGeom>
           <a:solidFill>
-            <a:srgbClr val="FF9933"/>
+            <a:srgbClr val="31859C"/>
           </a:solidFill>
           <a:ln>
             <a:solidFill>
@@ -9006,7 +9009,7 @@
             <a:avLst/>
           </a:prstGeom>
           <a:solidFill>
-            <a:srgbClr val="FF9933"/>
+            <a:srgbClr val="31859C"/>
           </a:solidFill>
           <a:ln>
             <a:solidFill>
@@ -9154,7 +9157,7 @@
           </a:prstGeom>
           <a:ln w="19050">
             <a:solidFill>
-              <a:srgbClr val="FF9933"/>
+              <a:srgbClr val="31859C"/>
             </a:solidFill>
             <a:tailEnd type="triangle"/>
           </a:ln>
@@ -9198,7 +9201,7 @@
           </a:prstGeom>
           <a:ln w="19050">
             <a:solidFill>
-              <a:srgbClr val="FF9933"/>
+              <a:srgbClr val="31859C"/>
             </a:solidFill>
             <a:tailEnd type="triangle"/>
           </a:ln>
@@ -9433,7 +9436,7 @@
           </a:prstGeom>
           <a:ln w="19050">
             <a:solidFill>
-              <a:srgbClr val="FF9933"/>
+              <a:srgbClr val="31859C"/>
             </a:solidFill>
             <a:tailEnd type="triangle"/>
           </a:ln>
@@ -9766,7 +9769,7 @@
           </a:prstGeom>
           <a:ln w="19050">
             <a:solidFill>
-              <a:srgbClr val="FF9933"/>
+              <a:srgbClr val="31859C"/>
             </a:solidFill>
             <a:prstDash val="sysDash"/>
             <a:headEnd type="arrow" w="med" len="med"/>
@@ -10428,7 +10431,7 @@
           </a:prstGeom>
           <a:ln w="19050">
             <a:solidFill>
-              <a:srgbClr val="FF9933"/>
+              <a:srgbClr val="31859C"/>
             </a:solidFill>
             <a:prstDash val="sysDash"/>
             <a:headEnd type="arrow" w="med" len="med"/>
@@ -11402,7 +11405,7 @@
           </a:prstGeom>
           <a:ln w="19050">
             <a:solidFill>
-              <a:srgbClr val="FF9933"/>
+              <a:srgbClr val="31859C"/>
             </a:solidFill>
             <a:prstDash val="sysDash"/>
             <a:headEnd type="arrow" w="med" len="med"/>
@@ -11448,7 +11451,7 @@
           </a:prstGeom>
           <a:ln w="19050">
             <a:solidFill>
-              <a:srgbClr val="FF9933"/>
+              <a:srgbClr val="31859C"/>
             </a:solidFill>
             <a:prstDash val="sysDash"/>
             <a:headEnd type="arrow" w="med" len="med"/>
@@ -11494,7 +11497,7 @@
           </a:prstGeom>
           <a:ln w="19050">
             <a:solidFill>
-              <a:srgbClr val="FF9933"/>
+              <a:srgbClr val="31859C"/>
             </a:solidFill>
             <a:prstDash val="sysDash"/>
             <a:headEnd type="arrow" w="med" len="med"/>
@@ -11532,15 +11535,15 @@
         </p:nvCxnSpPr>
         <p:spPr>
           <a:xfrm>
-            <a:off x="13733010" y="6771740"/>
-            <a:ext cx="5598454" cy="0"/>
+            <a:off x="13773697" y="6771740"/>
+            <a:ext cx="5557767" cy="0"/>
           </a:xfrm>
           <a:prstGeom prst="straightConnector1">
             <a:avLst/>
           </a:prstGeom>
           <a:ln w="19050">
             <a:solidFill>
-              <a:srgbClr val="FF9933"/>
+              <a:srgbClr val="31859C"/>
             </a:solidFill>
             <a:prstDash val="sysDash"/>
             <a:headEnd type="arrow" w="med" len="med"/>
@@ -13310,7 +13313,7 @@
         </p:nvSpPr>
         <p:spPr>
           <a:xfrm>
-            <a:off x="12117570" y="0"/>
+            <a:off x="12106048" y="-2"/>
             <a:ext cx="2650294" cy="8445863"/>
           </a:xfrm>
           <a:prstGeom prst="roundRect">
@@ -13319,10 +13322,7 @@
             </a:avLst>
           </a:prstGeom>
           <a:solidFill>
-            <a:schemeClr val="accent4">
-              <a:lumMod val="20000"/>
-              <a:lumOff val="80000"/>
-            </a:schemeClr>
+            <a:srgbClr val="93CDDD"/>
           </a:solidFill>
           <a:ln>
             <a:noFill/>
@@ -15357,7 +15357,7 @@
             <a:r>
               <a:rPr lang="en-US" sz="1200" b="1" dirty="0">
                 <a:solidFill>
-                  <a:srgbClr val="00B050"/>
+                  <a:srgbClr val="0070C0"/>
                 </a:solidFill>
               </a:rPr>
               <a:t>LOGIC</a:t>
@@ -15396,7 +15396,7 @@
             <a:r>
               <a:rPr lang="en-US" sz="1200" b="1" dirty="0">
                 <a:solidFill>
-                  <a:srgbClr val="00B050"/>
+                  <a:srgbClr val="31859C"/>
                 </a:solidFill>
               </a:rPr>
               <a:t>Commons</a:t>
@@ -16717,7 +16717,7 @@
         </p:nvSpPr>
         <p:spPr>
           <a:xfrm>
-            <a:off x="12039241" y="4462772"/>
+            <a:off x="12039241" y="4444992"/>
             <a:ext cx="1443600" cy="200055"/>
           </a:xfrm>
           <a:prstGeom prst="rect">
@@ -16733,7 +16733,7 @@
             <a:r>
               <a:rPr lang="en-US" sz="700" dirty="0">
                 <a:solidFill>
-                  <a:srgbClr val="FF9933"/>
+                  <a:srgbClr val="31859C"/>
                 </a:solidFill>
               </a:rPr>
               <a:t>distributionProcess(b ,d)</a:t>
@@ -16771,7 +16771,7 @@
             <a:r>
               <a:rPr lang="en-US" sz="700" dirty="0">
                 <a:solidFill>
-                  <a:srgbClr val="FF9933"/>
+                  <a:srgbClr val="31859C"/>
                 </a:solidFill>
               </a:rPr>
               <a:t>createNationalityMap(c)</a:t>
@@ -17033,7 +17033,7 @@
             <a:r>
               <a:rPr lang="en-US" sz="700" dirty="0">
                 <a:solidFill>
-                  <a:srgbClr val="FF9933"/>
+                  <a:srgbClr val="31859C"/>
                 </a:solidFill>
               </a:rPr>
               <a:t>findPerson(e, c)</a:t>
@@ -17071,7 +17071,7 @@
             <a:r>
               <a:rPr lang="en-US" sz="700" dirty="0">
                 <a:solidFill>
-                  <a:srgbClr val="FF9933"/>
+                  <a:srgbClr val="31859C"/>
                 </a:solidFill>
               </a:rPr>
               <a:t>selectiveDistributionByNationality(e, c)</a:t>
@@ -17109,7 +17109,7 @@
             <a:r>
               <a:rPr lang="en-US" sz="700" dirty="0">
                 <a:solidFill>
-                  <a:srgbClr val="FF9933"/>
+                  <a:srgbClr val="31859C"/>
                 </a:solidFill>
               </a:rPr>
               <a:t>distributionProcess(b ,d)</a:t>
@@ -17323,7 +17323,7 @@
             <a:r>
               <a:rPr lang="en-US" sz="700" dirty="0">
                 <a:solidFill>
-                  <a:srgbClr val="FF9933"/>
+                  <a:srgbClr val="31859C"/>
                 </a:solidFill>
               </a:rPr>
               <a:t>distributionProcess(b ,d)</a:t>
@@ -17361,7 +17361,7 @@
             <a:r>
               <a:rPr lang="en-US" sz="700" dirty="0">
                 <a:solidFill>
-                  <a:srgbClr val="FF9933"/>
+                  <a:srgbClr val="31859C"/>
                 </a:solidFill>
               </a:rPr>
               <a:t>filterGender(c, g, M)</a:t>
@@ -17399,7 +17399,7 @@
             <a:r>
               <a:rPr lang="en-US" sz="700" dirty="0">
                 <a:solidFill>
-                  <a:srgbClr val="FF9933"/>
+                  <a:srgbClr val="31859C"/>
                 </a:solidFill>
               </a:rPr>
               <a:t>filterGender(c, g, F)</a:t>
@@ -17437,7 +17437,7 @@
             <a:r>
               <a:rPr lang="en-US" sz="700" dirty="0">
                 <a:solidFill>
-                  <a:srgbClr val="FF9933"/>
+                  <a:srgbClr val="31859C"/>
                 </a:solidFill>
               </a:rPr>
               <a:t>selectiveDistributionByGender(e, c)</a:t>
@@ -17475,7 +17475,7 @@
             <a:r>
               <a:rPr lang="en-US" sz="700" dirty="0">
                 <a:solidFill>
-                  <a:srgbClr val="FF9933"/>
+                  <a:srgbClr val="31859C"/>
                 </a:solidFill>
               </a:rPr>
               <a:t>selectiveDistributionByGender(e, c)</a:t>
@@ -17512,7 +17512,11 @@
           <a:p>
             <a:pPr algn="ctr"/>
             <a:r>
-              <a:rPr lang="en-US" sz="1600" b="1" dirty="0"/>
+              <a:rPr lang="en-US" sz="1600" b="1" dirty="0">
+                <a:solidFill>
+                  <a:srgbClr val="31859C"/>
+                </a:solidFill>
+              </a:rPr>
               <a:t>Continue at Next Diagram</a:t>
             </a:r>
           </a:p>
@@ -17571,10 +17575,7 @@
             </a:avLst>
           </a:prstGeom>
           <a:solidFill>
-            <a:schemeClr val="accent4">
-              <a:lumMod val="20000"/>
-              <a:lumOff val="80000"/>
-            </a:schemeClr>
+            <a:srgbClr val="93CDDD"/>
           </a:solidFill>
           <a:ln>
             <a:noFill/>
@@ -17788,9 +17789,13 @@
             <a:avLst/>
           </a:prstGeom>
           <a:solidFill>
-            <a:srgbClr val="FF9933"/>
+            <a:srgbClr val="31859C"/>
           </a:solidFill>
-          <a:ln/>
+          <a:ln>
+            <a:solidFill>
+              <a:schemeClr val="tx1"/>
+            </a:solidFill>
+          </a:ln>
         </p:spPr>
         <p:style>
           <a:lnRef idx="1">
@@ -17858,7 +17863,7 @@
           </a:prstGeom>
           <a:ln w="19050">
             <a:solidFill>
-              <a:srgbClr val="FF9933"/>
+              <a:srgbClr val="31859C"/>
             </a:solidFill>
             <a:prstDash val="sysDash"/>
           </a:ln>
@@ -17900,7 +17905,7 @@
             <a:avLst/>
           </a:prstGeom>
           <a:solidFill>
-            <a:srgbClr val="FF9933"/>
+            <a:srgbClr val="31859C"/>
           </a:solidFill>
           <a:ln>
             <a:solidFill>
@@ -17965,7 +17970,7 @@
             <a:avLst/>
           </a:prstGeom>
           <a:solidFill>
-            <a:srgbClr val="FF9933"/>
+            <a:srgbClr val="31859C"/>
           </a:solidFill>
           <a:ln>
             <a:solidFill>
@@ -18030,7 +18035,7 @@
             <a:avLst/>
           </a:prstGeom>
           <a:solidFill>
-            <a:srgbClr val="FF9933"/>
+            <a:srgbClr val="31859C"/>
           </a:solidFill>
           <a:ln>
             <a:solidFill>
@@ -18098,7 +18103,7 @@
           </a:prstGeom>
           <a:ln w="19050">
             <a:solidFill>
-              <a:srgbClr val="FF9933"/>
+              <a:srgbClr val="31859C"/>
             </a:solidFill>
             <a:tailEnd type="triangle"/>
           </a:ln>
@@ -18139,7 +18144,7 @@
             <a:avLst/>
           </a:prstGeom>
           <a:solidFill>
-            <a:srgbClr val="FF9933"/>
+            <a:srgbClr val="31859C"/>
           </a:solidFill>
           <a:ln>
             <a:solidFill>
@@ -18204,7 +18209,7 @@
             <a:avLst/>
           </a:prstGeom>
           <a:solidFill>
-            <a:srgbClr val="FF9933"/>
+            <a:srgbClr val="31859C"/>
           </a:solidFill>
           <a:ln>
             <a:solidFill>
@@ -18272,7 +18277,7 @@
           </a:prstGeom>
           <a:ln w="19050">
             <a:solidFill>
-              <a:srgbClr val="FF9933"/>
+              <a:srgbClr val="31859C"/>
             </a:solidFill>
             <a:tailEnd type="triangle"/>
           </a:ln>
@@ -18316,7 +18321,7 @@
           </a:prstGeom>
           <a:ln w="19050">
             <a:solidFill>
-              <a:srgbClr val="FF9933"/>
+              <a:srgbClr val="31859C"/>
             </a:solidFill>
             <a:tailEnd type="triangle"/>
           </a:ln>
@@ -18367,7 +18372,7 @@
             <a:r>
               <a:rPr lang="en-US" sz="1200" b="1" dirty="0">
                 <a:solidFill>
-                  <a:srgbClr val="00B050"/>
+                  <a:srgbClr val="0070C0"/>
                 </a:solidFill>
               </a:rPr>
               <a:t>Logic</a:t>
@@ -18399,7 +18404,7 @@
           </a:prstGeom>
           <a:ln w="19050">
             <a:solidFill>
-              <a:srgbClr val="FF9933"/>
+              <a:srgbClr val="31859C"/>
             </a:solidFill>
             <a:tailEnd type="triangle"/>
           </a:ln>
@@ -18447,22 +18452,42 @@
           <a:lstStyle/>
           <a:p>
             <a:r>
-              <a:rPr lang="en-US" sz="700" dirty="0"/>
+              <a:rPr lang="en-US" sz="700" dirty="0">
+                <a:solidFill>
+                  <a:srgbClr val="31859C"/>
+                </a:solidFill>
+              </a:rPr>
               <a:t>createGroupWithout</a:t>
             </a:r>
           </a:p>
           <a:p>
             <a:r>
-              <a:rPr lang="en-US" sz="700" dirty="0"/>
+              <a:rPr lang="en-US" sz="700" dirty="0">
+                <a:solidFill>
+                  <a:srgbClr val="31859C"/>
+                </a:solidFill>
+              </a:rPr>
               <a:t>Commit(grp, mdl)</a:t>
             </a:r>
             <a:br>
-              <a:rPr lang="en-US" sz="700" dirty="0"/>
+              <a:rPr lang="en-US" sz="700" dirty="0">
+                <a:solidFill>
+                  <a:srgbClr val="31859C"/>
+                </a:solidFill>
+              </a:rPr>
             </a:br>
-            <a:endParaRPr lang="en-US" sz="700" dirty="0"/>
-          </a:p>
-          <a:p>
-            <a:endParaRPr lang="en-US" sz="700" dirty="0"/>
+            <a:endParaRPr lang="en-US" sz="700" dirty="0">
+              <a:solidFill>
+                <a:srgbClr val="31859C"/>
+              </a:solidFill>
+            </a:endParaRPr>
+          </a:p>
+          <a:p>
+            <a:endParaRPr lang="en-US" sz="700" dirty="0">
+              <a:solidFill>
+                <a:srgbClr val="31859C"/>
+              </a:solidFill>
+            </a:endParaRPr>
           </a:p>
         </p:txBody>
       </p:sp>
@@ -18607,7 +18632,7 @@
           </a:prstGeom>
           <a:ln w="19050">
             <a:solidFill>
-              <a:srgbClr val="FF9933"/>
+              <a:srgbClr val="31859C"/>
             </a:solidFill>
             <a:prstDash val="sysDash"/>
             <a:headEnd type="arrow" w="med" len="med"/>
@@ -19271,7 +19296,7 @@
           </a:prstGeom>
           <a:ln w="19050">
             <a:solidFill>
-              <a:srgbClr val="FF9933"/>
+              <a:srgbClr val="31859C"/>
             </a:solidFill>
             <a:prstDash val="sysDash"/>
             <a:headEnd type="arrow" w="med" len="med"/>
@@ -19444,7 +19469,7 @@
           </a:prstGeom>
           <a:ln w="19050">
             <a:solidFill>
-              <a:srgbClr val="FF9933"/>
+              <a:srgbClr val="31859C"/>
             </a:solidFill>
             <a:prstDash val="sysDash"/>
             <a:headEnd type="arrow" w="med" len="med"/>
@@ -19490,7 +19515,7 @@
           </a:prstGeom>
           <a:ln w="19050">
             <a:solidFill>
-              <a:srgbClr val="FF9933"/>
+              <a:srgbClr val="31859C"/>
             </a:solidFill>
             <a:prstDash val="sysDash"/>
             <a:headEnd type="arrow" w="med" len="med"/>
@@ -20776,7 +20801,7 @@
           </a:xfrm>
           <a:prstGeom prst="bentConnector3">
             <a:avLst>
-              <a:gd name="adj1" fmla="val -6116"/>
+              <a:gd name="adj1" fmla="val 777"/>
             </a:avLst>
           </a:prstGeom>
           <a:ln>
@@ -20830,7 +20855,7 @@
             <a:r>
               <a:rPr lang="en-US" sz="1200" b="1" dirty="0">
                 <a:solidFill>
-                  <a:srgbClr val="00B050"/>
+                  <a:srgbClr val="31859C"/>
                 </a:solidFill>
               </a:rPr>
               <a:t>Commons</a:t>
@@ -21985,7 +22010,11 @@
           <a:lstStyle/>
           <a:p>
             <a:r>
-              <a:rPr lang="en-US" sz="700" dirty="0"/>
+              <a:rPr lang="en-US" sz="700" dirty="0">
+                <a:solidFill>
+                  <a:srgbClr val="31859C"/>
+                </a:solidFill>
+              </a:rPr>
               <a:t>distributionProcess(b ,d)</a:t>
             </a:r>
           </a:p>
@@ -22019,7 +22048,11 @@
           <a:lstStyle/>
           <a:p>
             <a:r>
-              <a:rPr lang="en-US" sz="700" dirty="0"/>
+              <a:rPr lang="en-US" sz="700" dirty="0">
+                <a:solidFill>
+                  <a:srgbClr val="31859C"/>
+                </a:solidFill>
+              </a:rPr>
               <a:t>createNationalityMap(c)</a:t>
             </a:r>
           </a:p>
@@ -22099,7 +22132,11 @@
           <a:lstStyle/>
           <a:p>
             <a:r>
-              <a:rPr lang="en-US" sz="700" dirty="0"/>
+              <a:rPr lang="en-US" sz="700" dirty="0">
+                <a:solidFill>
+                  <a:srgbClr val="31859C"/>
+                </a:solidFill>
+              </a:rPr>
               <a:t>findPerson(e, c)</a:t>
             </a:r>
           </a:p>
@@ -22133,7 +22170,11 @@
           <a:lstStyle/>
           <a:p>
             <a:r>
-              <a:rPr lang="en-US" sz="650" dirty="0"/>
+              <a:rPr lang="en-US" sz="650" dirty="0">
+                <a:solidFill>
+                  <a:srgbClr val="31859C"/>
+                </a:solidFill>
+              </a:rPr>
               <a:t>selectiveDistributionByNationality(e, c)</a:t>
             </a:r>
           </a:p>
@@ -22167,7 +22208,11 @@
           <a:lstStyle/>
           <a:p>
             <a:r>
-              <a:rPr lang="en-US" sz="700" dirty="0"/>
+              <a:rPr lang="en-US" sz="700" dirty="0">
+                <a:solidFill>
+                  <a:srgbClr val="31859C"/>
+                </a:solidFill>
+              </a:rPr>
               <a:t>selectiveDistributionByGender(e, c)</a:t>
             </a:r>
           </a:p>
@@ -22527,7 +22572,7 @@
             <a:avLst/>
           </a:prstGeom>
           <a:solidFill>
-            <a:srgbClr val="FF9933"/>
+            <a:srgbClr val="31859C"/>
           </a:solidFill>
           <a:ln>
             <a:solidFill>
@@ -22636,7 +22681,7 @@
             <a:avLst/>
           </a:prstGeom>
           <a:solidFill>
-            <a:srgbClr val="FF9933"/>
+            <a:srgbClr val="31859C"/>
           </a:solidFill>
           <a:ln>
             <a:solidFill>
@@ -22745,7 +22790,7 @@
             <a:avLst/>
           </a:prstGeom>
           <a:solidFill>
-            <a:srgbClr val="FF9933"/>
+            <a:srgbClr val="31859C"/>
           </a:solidFill>
           <a:ln>
             <a:solidFill>
@@ -22854,7 +22899,7 @@
             <a:avLst/>
           </a:prstGeom>
           <a:solidFill>
-            <a:srgbClr val="FF9933"/>
+            <a:srgbClr val="31859C"/>
           </a:solidFill>
           <a:ln>
             <a:solidFill>
@@ -22963,7 +23008,7 @@
             <a:avLst/>
           </a:prstGeom>
           <a:solidFill>
-            <a:srgbClr val="FF9933"/>
+            <a:srgbClr val="31859C"/>
           </a:solidFill>
           <a:ln>
             <a:solidFill>
@@ -23072,7 +23117,7 @@
             <a:avLst/>
           </a:prstGeom>
           <a:solidFill>
-            <a:srgbClr val="FF9933"/>
+            <a:srgbClr val="31859C"/>
           </a:solidFill>
           <a:ln>
             <a:solidFill>
@@ -23188,7 +23233,11 @@
           <a:lstStyle/>
           <a:p>
             <a:r>
-              <a:rPr lang="en-US" sz="700" dirty="0"/>
+              <a:rPr lang="en-US" sz="700" dirty="0">
+                <a:solidFill>
+                  <a:srgbClr val="31859C"/>
+                </a:solidFill>
+              </a:rPr>
               <a:t>distributionProcess(b ,d)</a:t>
             </a:r>
           </a:p>
@@ -23222,7 +23271,11 @@
           <a:lstStyle/>
           <a:p>
             <a:r>
-              <a:rPr lang="en-US" sz="700" dirty="0"/>
+              <a:rPr lang="en-US" sz="700" dirty="0">
+                <a:solidFill>
+                  <a:srgbClr val="31859C"/>
+                </a:solidFill>
+              </a:rPr>
               <a:t>distributionProcess(b ,d)</a:t>
             </a:r>
           </a:p>
@@ -23256,7 +23309,11 @@
           <a:lstStyle/>
           <a:p>
             <a:r>
-              <a:rPr lang="en-US" sz="700" dirty="0"/>
+              <a:rPr lang="en-US" sz="700" dirty="0">
+                <a:solidFill>
+                  <a:srgbClr val="31859C"/>
+                </a:solidFill>
+              </a:rPr>
               <a:t>filterGender(c, g, M)</a:t>
             </a:r>
           </a:p>
@@ -23290,7 +23347,11 @@
           <a:lstStyle/>
           <a:p>
             <a:r>
-              <a:rPr lang="en-US" sz="700" dirty="0"/>
+              <a:rPr lang="en-US" sz="700" dirty="0">
+                <a:solidFill>
+                  <a:srgbClr val="31859C"/>
+                </a:solidFill>
+              </a:rPr>
               <a:t>filterGender(c, g, F)</a:t>
             </a:r>
           </a:p>
@@ -23324,7 +23385,11 @@
           <a:lstStyle/>
           <a:p>
             <a:r>
-              <a:rPr lang="en-US" sz="700" dirty="0"/>
+              <a:rPr lang="en-US" sz="700" dirty="0">
+                <a:solidFill>
+                  <a:srgbClr val="31859C"/>
+                </a:solidFill>
+              </a:rPr>
               <a:t>selectiveDistributionByGender(e, c)</a:t>
             </a:r>
           </a:p>
@@ -23361,7 +23426,7 @@
             <a:r>
               <a:rPr lang="en-US" sz="1200" b="1" dirty="0">
                 <a:solidFill>
-                  <a:srgbClr val="00B050"/>
+                  <a:srgbClr val="0070C0"/>
                 </a:solidFill>
               </a:rPr>
               <a:t>Logic</a:t>
@@ -23397,28 +23462,52 @@
           <a:lstStyle/>
           <a:p>
             <a:r>
-              <a:rPr lang="en-US" sz="700" dirty="0"/>
+              <a:rPr lang="en-US" sz="700" dirty="0">
+                <a:solidFill>
+                  <a:srgbClr val="0070C0"/>
+                </a:solidFill>
+              </a:rPr>
               <a:t>addPersonIntoGroup</a:t>
             </a:r>
           </a:p>
           <a:p>
             <a:r>
-              <a:rPr lang="en-US" sz="700" dirty="0"/>
+              <a:rPr lang="en-US" sz="700" dirty="0">
+                <a:solidFill>
+                  <a:srgbClr val="0070C0"/>
+                </a:solidFill>
+              </a:rPr>
               <a:t>WithoutCommit</a:t>
             </a:r>
           </a:p>
           <a:p>
             <a:r>
-              <a:rPr lang="en-US" sz="700" dirty="0"/>
+              <a:rPr lang="en-US" sz="700" dirty="0">
+                <a:solidFill>
+                  <a:srgbClr val="0070C0"/>
+                </a:solidFill>
+              </a:rPr>
               <a:t> (agrp, mdl)</a:t>
             </a:r>
             <a:br>
-              <a:rPr lang="en-US" sz="700" dirty="0"/>
+              <a:rPr lang="en-US" sz="700" dirty="0">
+                <a:solidFill>
+                  <a:srgbClr val="0070C0"/>
+                </a:solidFill>
+              </a:rPr>
             </a:br>
-            <a:endParaRPr lang="en-US" sz="700" dirty="0"/>
-          </a:p>
-          <a:p>
-            <a:endParaRPr lang="en-US" sz="700" dirty="0"/>
+            <a:endParaRPr lang="en-US" sz="700" dirty="0">
+              <a:solidFill>
+                <a:srgbClr val="0070C0"/>
+              </a:solidFill>
+            </a:endParaRPr>
+          </a:p>
+          <a:p>
+            <a:endParaRPr lang="en-US" sz="700" dirty="0">
+              <a:solidFill>
+                <a:srgbClr val="0070C0"/>
+              </a:solidFill>
+            </a:endParaRPr>
           </a:p>
         </p:txBody>
       </p:sp>
@@ -23487,7 +23576,7 @@
           </a:prstGeom>
           <a:ln w="19050">
             <a:solidFill>
-              <a:srgbClr val="FF9933"/>
+              <a:srgbClr val="31859C"/>
             </a:solidFill>
             <a:prstDash val="sysDash"/>
             <a:headEnd type="arrow" w="med" len="med"/>
@@ -24582,7 +24671,7 @@
           </a:prstGeom>
           <a:ln w="19050">
             <a:solidFill>
-              <a:srgbClr val="FF9933"/>
+              <a:srgbClr val="31859C"/>
             </a:solidFill>
             <a:tailEnd type="triangle"/>
           </a:ln>
@@ -24626,7 +24715,7 @@
           </a:prstGeom>
           <a:ln w="19050">
             <a:solidFill>
-              <a:srgbClr val="FF9933"/>
+              <a:srgbClr val="31859C"/>
             </a:solidFill>
             <a:tailEnd type="triangle"/>
           </a:ln>
@@ -24670,7 +24759,7 @@
           </a:prstGeom>
           <a:ln w="19050">
             <a:solidFill>
-              <a:srgbClr val="FF9933"/>
+              <a:srgbClr val="31859C"/>
             </a:solidFill>
             <a:prstDash val="sysDash"/>
             <a:headEnd type="arrow" w="med" len="med"/>
@@ -24720,22 +24809,42 @@
           <a:lstStyle/>
           <a:p>
             <a:r>
-              <a:rPr lang="en-US" sz="700" dirty="0"/>
+              <a:rPr lang="en-US" sz="700" dirty="0">
+                <a:solidFill>
+                  <a:srgbClr val="31859C"/>
+                </a:solidFill>
+              </a:rPr>
               <a:t>createGroupWithout</a:t>
             </a:r>
           </a:p>
           <a:p>
             <a:r>
-              <a:rPr lang="en-US" sz="700" dirty="0"/>
+              <a:rPr lang="en-US" sz="700" dirty="0">
+                <a:solidFill>
+                  <a:srgbClr val="31859C"/>
+                </a:solidFill>
+              </a:rPr>
               <a:t>Commit(grp, mdl)</a:t>
             </a:r>
             <a:br>
-              <a:rPr lang="en-US" sz="700" dirty="0"/>
+              <a:rPr lang="en-US" sz="700" dirty="0">
+                <a:solidFill>
+                  <a:srgbClr val="31859C"/>
+                </a:solidFill>
+              </a:rPr>
             </a:br>
-            <a:endParaRPr lang="en-US" sz="700" dirty="0"/>
-          </a:p>
-          <a:p>
-            <a:endParaRPr lang="en-US" sz="700" dirty="0"/>
+            <a:endParaRPr lang="en-US" sz="700" dirty="0">
+              <a:solidFill>
+                <a:srgbClr val="31859C"/>
+              </a:solidFill>
+            </a:endParaRPr>
+          </a:p>
+          <a:p>
+            <a:endParaRPr lang="en-US" sz="700" dirty="0">
+              <a:solidFill>
+                <a:srgbClr val="31859C"/>
+              </a:solidFill>
+            </a:endParaRPr>
           </a:p>
         </p:txBody>
       </p:sp>
@@ -24759,6 +24868,7 @@
           <a:prstGeom prst="rect">
             <a:avLst/>
           </a:prstGeom>
+          <a:noFill/>
         </p:spPr>
         <p:txBody>
           <a:bodyPr wrap="square">
@@ -24767,22 +24877,42 @@
           <a:lstStyle/>
           <a:p>
             <a:r>
-              <a:rPr lang="en-US" sz="700" dirty="0"/>
+              <a:rPr lang="en-US" sz="700" dirty="0">
+                <a:solidFill>
+                  <a:srgbClr val="0070C0"/>
+                </a:solidFill>
+              </a:rPr>
               <a:t>createGroupWithout</a:t>
             </a:r>
           </a:p>
           <a:p>
             <a:r>
-              <a:rPr lang="en-US" sz="700" dirty="0"/>
+              <a:rPr lang="en-US" sz="700" dirty="0">
+                <a:solidFill>
+                  <a:srgbClr val="0070C0"/>
+                </a:solidFill>
+              </a:rPr>
               <a:t>Commit(grp, mdl)</a:t>
             </a:r>
             <a:br>
-              <a:rPr lang="en-US" sz="700" dirty="0"/>
+              <a:rPr lang="en-US" sz="700" dirty="0">
+                <a:solidFill>
+                  <a:srgbClr val="0070C0"/>
+                </a:solidFill>
+              </a:rPr>
             </a:br>
-            <a:endParaRPr lang="en-US" sz="700" dirty="0"/>
-          </a:p>
-          <a:p>
-            <a:endParaRPr lang="en-US" sz="700" dirty="0"/>
+            <a:endParaRPr lang="en-US" sz="700" dirty="0">
+              <a:solidFill>
+                <a:srgbClr val="0070C0"/>
+              </a:solidFill>
+            </a:endParaRPr>
+          </a:p>
+          <a:p>
+            <a:endParaRPr lang="en-US" sz="700" dirty="0">
+              <a:solidFill>
+                <a:srgbClr val="0070C0"/>
+              </a:solidFill>
+            </a:endParaRPr>
           </a:p>
         </p:txBody>
       </p:sp>
@@ -24814,28 +24944,52 @@
           <a:lstStyle/>
           <a:p>
             <a:r>
-              <a:rPr lang="en-US" sz="700" dirty="0"/>
+              <a:rPr lang="en-US" sz="700" dirty="0">
+                <a:solidFill>
+                  <a:srgbClr val="0070C0"/>
+                </a:solidFill>
+              </a:rPr>
               <a:t>addPersonIntoGroup</a:t>
             </a:r>
           </a:p>
           <a:p>
             <a:r>
-              <a:rPr lang="en-US" sz="700" dirty="0"/>
+              <a:rPr lang="en-US" sz="700" dirty="0">
+                <a:solidFill>
+                  <a:srgbClr val="0070C0"/>
+                </a:solidFill>
+              </a:rPr>
               <a:t>WithoutCommit</a:t>
             </a:r>
           </a:p>
           <a:p>
             <a:r>
-              <a:rPr lang="en-US" sz="700" dirty="0"/>
+              <a:rPr lang="en-US" sz="700" dirty="0">
+                <a:solidFill>
+                  <a:srgbClr val="0070C0"/>
+                </a:solidFill>
+              </a:rPr>
               <a:t> (agrp, mdl)</a:t>
             </a:r>
             <a:br>
-              <a:rPr lang="en-US" sz="700" dirty="0"/>
+              <a:rPr lang="en-US" sz="700" dirty="0">
+                <a:solidFill>
+                  <a:srgbClr val="0070C0"/>
+                </a:solidFill>
+              </a:rPr>
             </a:br>
-            <a:endParaRPr lang="en-US" sz="700" dirty="0"/>
-          </a:p>
-          <a:p>
-            <a:endParaRPr lang="en-US" sz="700" dirty="0"/>
+            <a:endParaRPr lang="en-US" sz="700" dirty="0">
+              <a:solidFill>
+                <a:srgbClr val="0070C0"/>
+              </a:solidFill>
+            </a:endParaRPr>
+          </a:p>
+          <a:p>
+            <a:endParaRPr lang="en-US" sz="700" dirty="0">
+              <a:solidFill>
+                <a:srgbClr val="0070C0"/>
+              </a:solidFill>
+            </a:endParaRPr>
           </a:p>
         </p:txBody>
       </p:sp>
@@ -24867,28 +25021,52 @@
           <a:lstStyle/>
           <a:p>
             <a:r>
-              <a:rPr lang="en-US" sz="700" dirty="0"/>
+              <a:rPr lang="en-US" sz="700" dirty="0">
+                <a:solidFill>
+                  <a:srgbClr val="0070C0"/>
+                </a:solidFill>
+              </a:rPr>
               <a:t>addPersonIntoGroup</a:t>
             </a:r>
           </a:p>
           <a:p>
             <a:r>
-              <a:rPr lang="en-US" sz="700" dirty="0"/>
+              <a:rPr lang="en-US" sz="700" dirty="0">
+                <a:solidFill>
+                  <a:srgbClr val="0070C0"/>
+                </a:solidFill>
+              </a:rPr>
               <a:t>WithoutCommit</a:t>
             </a:r>
           </a:p>
           <a:p>
             <a:r>
-              <a:rPr lang="en-US" sz="700" dirty="0"/>
+              <a:rPr lang="en-US" sz="700" dirty="0">
+                <a:solidFill>
+                  <a:srgbClr val="0070C0"/>
+                </a:solidFill>
+              </a:rPr>
               <a:t> (agrp, mdl)</a:t>
             </a:r>
             <a:br>
-              <a:rPr lang="en-US" sz="700" dirty="0"/>
+              <a:rPr lang="en-US" sz="700" dirty="0">
+                <a:solidFill>
+                  <a:srgbClr val="0070C0"/>
+                </a:solidFill>
+              </a:rPr>
             </a:br>
-            <a:endParaRPr lang="en-US" sz="700" dirty="0"/>
-          </a:p>
-          <a:p>
-            <a:endParaRPr lang="en-US" sz="700" dirty="0"/>
+            <a:endParaRPr lang="en-US" sz="700" dirty="0">
+              <a:solidFill>
+                <a:srgbClr val="0070C0"/>
+              </a:solidFill>
+            </a:endParaRPr>
+          </a:p>
+          <a:p>
+            <a:endParaRPr lang="en-US" sz="700" dirty="0">
+              <a:solidFill>
+                <a:srgbClr val="0070C0"/>
+              </a:solidFill>
+            </a:endParaRPr>
           </a:p>
         </p:txBody>
       </p:sp>

</xml_diff>